<commit_message>
Edited notif board requirements according to ppt coz v felt it would be easier this way
</commit_message>
<xml_diff>
--- a/SubRoutine Diagrams/Notice Board.pptx
+++ b/SubRoutine Diagrams/Notice Board.pptx
@@ -1364,7 +1364,7 @@
           <a:p>
             <a:fld id="{59088EAF-6ECA-4616-85EF-35AA19C641F3}" type="datetimeFigureOut">
               <a:rPr lang="en-US"/>
-              <a:t>5/20/2020</a:t>
+              <a:t>5/21/2020</a:t>
             </a:fld>
             <a:endParaRPr/>
           </a:p>
@@ -1529,7 +1529,7 @@
           <a:p>
             <a:fld id="{3ABD2D7A-D230-4F91-BD59-0A39C2703BA8}" type="datetimeFigureOut">
               <a:rPr lang="en-US"/>
-              <a:t>5/20/2020</a:t>
+              <a:t>5/21/2020</a:t>
             </a:fld>
             <a:endParaRPr/>
           </a:p>
@@ -2107,7 +2107,7 @@
           <a:p>
             <a:fld id="{03F41C87-7AD9-4845-A077-840E4A0F3F06}" type="datetimeFigureOut">
               <a:rPr lang="en-US"/>
-              <a:t>5/20/2020</a:t>
+              <a:t>5/21/2020</a:t>
             </a:fld>
             <a:endParaRPr/>
           </a:p>
@@ -2291,7 +2291,7 @@
           <a:p>
             <a:fld id="{03F41C87-7AD9-4845-A077-840E4A0F3F06}" type="datetimeFigureOut">
               <a:rPr lang="en-US"/>
-              <a:t>5/20/2020</a:t>
+              <a:t>5/21/2020</a:t>
             </a:fld>
             <a:endParaRPr/>
           </a:p>
@@ -2472,7 +2472,7 @@
           <a:p>
             <a:fld id="{03F41C87-7AD9-4845-A077-840E4A0F3F06}" type="datetimeFigureOut">
               <a:rPr lang="en-US"/>
-              <a:t>5/20/2020</a:t>
+              <a:t>5/21/2020</a:t>
             </a:fld>
             <a:endParaRPr/>
           </a:p>
@@ -2749,7 +2749,7 @@
           <a:p>
             <a:fld id="{03F41C87-7AD9-4845-A077-840E4A0F3F06}" type="datetimeFigureOut">
               <a:rPr lang="en-US"/>
-              <a:t>5/20/2020</a:t>
+              <a:t>5/21/2020</a:t>
             </a:fld>
             <a:endParaRPr/>
           </a:p>
@@ -3039,7 +3039,7 @@
           <a:p>
             <a:fld id="{03F41C87-7AD9-4845-A077-840E4A0F3F06}" type="datetimeFigureOut">
               <a:rPr lang="en-US"/>
-              <a:t>5/20/2020</a:t>
+              <a:t>5/21/2020</a:t>
             </a:fld>
             <a:endParaRPr/>
           </a:p>
@@ -3479,7 +3479,7 @@
           <a:p>
             <a:fld id="{03F41C87-7AD9-4845-A077-840E4A0F3F06}" type="datetimeFigureOut">
               <a:rPr lang="en-US"/>
-              <a:t>5/20/2020</a:t>
+              <a:t>5/21/2020</a:t>
             </a:fld>
             <a:endParaRPr/>
           </a:p>
@@ -3607,7 +3607,7 @@
           <a:p>
             <a:fld id="{03F41C87-7AD9-4845-A077-840E4A0F3F06}" type="datetimeFigureOut">
               <a:rPr lang="en-US"/>
-              <a:t>5/20/2020</a:t>
+              <a:t>5/21/2020</a:t>
             </a:fld>
             <a:endParaRPr/>
           </a:p>
@@ -3722,7 +3722,7 @@
           <a:p>
             <a:fld id="{03F41C87-7AD9-4845-A077-840E4A0F3F06}" type="datetimeFigureOut">
               <a:rPr lang="en-US"/>
-              <a:t>5/20/2020</a:t>
+              <a:t>5/21/2020</a:t>
             </a:fld>
             <a:endParaRPr/>
           </a:p>
@@ -4035,7 +4035,7 @@
           <a:p>
             <a:fld id="{03F41C87-7AD9-4845-A077-840E4A0F3F06}" type="datetimeFigureOut">
               <a:rPr lang="en-US"/>
-              <a:t>5/20/2020</a:t>
+              <a:t>5/21/2020</a:t>
             </a:fld>
             <a:endParaRPr/>
           </a:p>
@@ -4340,7 +4340,7 @@
             <a:fld id="{03F41C87-7AD9-4845-A077-840E4A0F3F06}" type="datetimeFigureOut">
               <a:rPr lang="en-US"/>
               <a:pPr/>
-              <a:t>5/20/2020</a:t>
+              <a:t>5/21/2020</a:t>
             </a:fld>
             <a:endParaRPr/>
           </a:p>
@@ -4573,7 +4573,7 @@
             <a:fld id="{03F41C87-7AD9-4845-A077-840E4A0F3F06}" type="datetimeFigureOut">
               <a:rPr lang="en-US"/>
               <a:pPr/>
-              <a:t>5/20/2020</a:t>
+              <a:t>5/21/2020</a:t>
             </a:fld>
             <a:endParaRPr/>
           </a:p>
@@ -5313,7 +5313,10 @@
           <a:lstStyle/>
           <a:p>
             <a:pPr algn="ctr"/>
-            <a:endParaRPr lang="en-US"/>
+            <a:r>
+              <a:rPr lang="en-US" dirty="0"/>
+              <a:t>(Non-Permanent)</a:t>
+            </a:r>
           </a:p>
         </p:txBody>
       </p:sp>
@@ -5924,10 +5927,10 @@
         </p:nvGrpSpPr>
         <p:grpSpPr>
           <a:xfrm>
-            <a:off x="1398032" y="1831161"/>
-            <a:ext cx="9404092" cy="4711330"/>
-            <a:chOff x="803225" y="1859500"/>
-            <a:chExt cx="9404092" cy="4711330"/>
+            <a:off x="1392366" y="1835130"/>
+            <a:ext cx="9404092" cy="4666193"/>
+            <a:chOff x="803225" y="1904637"/>
+            <a:chExt cx="9404092" cy="4666193"/>
           </a:xfrm>
         </p:grpSpPr>
         <p:sp>
@@ -6046,7 +6049,7 @@
           </p:nvSpPr>
           <p:spPr>
             <a:xfrm>
-              <a:off x="4393458" y="1859500"/>
+              <a:off x="4421295" y="1904637"/>
               <a:ext cx="1605510" cy="850165"/>
             </a:xfrm>
             <a:prstGeom prst="ellipse">
@@ -6075,7 +6078,7 @@
             <a:p>
               <a:pPr algn="ctr"/>
               <a:r>
-                <a:rPr lang="en-US" sz="1600"/>
+                <a:rPr lang="en-US" sz="1600" dirty="0"/>
                 <a:t>Scheduling meetings</a:t>
               </a:r>
             </a:p>
@@ -6145,7 +6148,7 @@
           </p:nvSpPr>
           <p:spPr>
             <a:xfrm>
-              <a:off x="4490224" y="3484260"/>
+              <a:off x="4490224" y="3535032"/>
               <a:ext cx="1605510" cy="850165"/>
             </a:xfrm>
             <a:prstGeom prst="ellipse">
@@ -6174,10 +6177,10 @@
             <a:p>
               <a:pPr algn="ctr"/>
               <a:r>
-                <a:rPr lang="en-US" sz="1600"/>
+                <a:rPr lang="en-US" sz="1600" dirty="0"/>
                 <a:t>Announcements</a:t>
               </a:r>
-              <a:endParaRPr lang="en-US"/>
+              <a:endParaRPr lang="en-US" dirty="0"/>
             </a:p>
           </p:txBody>
         </p:sp>
@@ -6344,7 +6347,7 @@
           </p:nvSpPr>
           <p:spPr>
             <a:xfrm>
-              <a:off x="8394096" y="2329720"/>
+              <a:off x="8394096" y="2495941"/>
               <a:ext cx="1813221" cy="2928346"/>
             </a:xfrm>
             <a:prstGeom prst="can">
@@ -6392,13 +6395,17 @@
                 </a:ext>
               </a:extLst>
             </p:cNvPr>
-            <p:cNvCxnSpPr/>
+            <p:cNvCxnSpPr>
+              <a:cxnSpLocks/>
+              <a:stCxn id="15" idx="6"/>
+              <a:endCxn id="23" idx="2"/>
+            </p:cNvCxnSpPr>
             <p:nvPr/>
           </p:nvCxnSpPr>
           <p:spPr>
             <a:xfrm>
-              <a:off x="6024307" y="2291668"/>
-              <a:ext cx="2377815" cy="1585086"/>
+              <a:off x="6026805" y="2329720"/>
+              <a:ext cx="2367291" cy="1630394"/>
             </a:xfrm>
             <a:prstGeom prst="straightConnector1">
               <a:avLst/>
@@ -6433,13 +6440,15 @@
             </p:cNvPr>
             <p:cNvCxnSpPr>
               <a:cxnSpLocks/>
+              <a:stCxn id="18" idx="6"/>
+              <a:endCxn id="23" idx="2"/>
             </p:cNvCxnSpPr>
             <p:nvPr/>
           </p:nvCxnSpPr>
           <p:spPr>
             <a:xfrm flipV="1">
-              <a:off x="5999182" y="3857862"/>
-              <a:ext cx="2425021" cy="1889"/>
+              <a:off x="6095734" y="3960114"/>
+              <a:ext cx="2298362" cy="1"/>
             </a:xfrm>
             <a:prstGeom prst="straightConnector1">
               <a:avLst/>
@@ -6474,13 +6483,15 @@
             </p:cNvPr>
             <p:cNvCxnSpPr>
               <a:cxnSpLocks/>
+              <a:stCxn id="20" idx="6"/>
+              <a:endCxn id="23" idx="2"/>
             </p:cNvCxnSpPr>
             <p:nvPr/>
           </p:nvCxnSpPr>
           <p:spPr>
             <a:xfrm flipV="1">
-              <a:off x="6188082" y="3867308"/>
-              <a:ext cx="2217311" cy="1617201"/>
+              <a:off x="6220873" y="3960114"/>
+              <a:ext cx="2173223" cy="1531481"/>
             </a:xfrm>
             <a:prstGeom prst="straightConnector1">
               <a:avLst/>
@@ -6515,13 +6526,15 @@
             </p:cNvPr>
             <p:cNvCxnSpPr>
               <a:cxnSpLocks/>
+              <a:stCxn id="14" idx="0"/>
+              <a:endCxn id="37" idx="2"/>
             </p:cNvCxnSpPr>
             <p:nvPr/>
           </p:nvCxnSpPr>
           <p:spPr>
-            <a:xfrm flipH="1" flipV="1">
-              <a:off x="2155273" y="3007696"/>
-              <a:ext cx="10854" cy="379741"/>
+            <a:xfrm flipV="1">
+              <a:off x="2178437" y="2863167"/>
+              <a:ext cx="0" cy="478219"/>
             </a:xfrm>
             <a:prstGeom prst="straightConnector1">
               <a:avLst/>
@@ -6556,13 +6569,15 @@
             </p:cNvPr>
             <p:cNvCxnSpPr>
               <a:cxnSpLocks/>
+              <a:stCxn id="14" idx="6"/>
+              <a:endCxn id="18" idx="2"/>
             </p:cNvCxnSpPr>
             <p:nvPr/>
           </p:nvCxnSpPr>
           <p:spPr>
             <a:xfrm flipV="1">
-              <a:off x="3384139" y="3952324"/>
-              <a:ext cx="1159877" cy="11334"/>
+              <a:off x="3420216" y="3960115"/>
+              <a:ext cx="1070008" cy="4726"/>
             </a:xfrm>
             <a:prstGeom prst="straightConnector1">
               <a:avLst/>
@@ -6597,13 +6612,15 @@
             </p:cNvPr>
             <p:cNvCxnSpPr>
               <a:cxnSpLocks/>
+              <a:stCxn id="14" idx="6"/>
+              <a:endCxn id="20" idx="2"/>
             </p:cNvCxnSpPr>
             <p:nvPr/>
           </p:nvCxnSpPr>
           <p:spPr>
             <a:xfrm>
-              <a:off x="3374772" y="3991998"/>
-              <a:ext cx="1131552" cy="1518963"/>
+              <a:off x="3420216" y="3964841"/>
+              <a:ext cx="1072410" cy="1526754"/>
             </a:xfrm>
             <a:prstGeom prst="straightConnector1">
               <a:avLst/>
@@ -6642,7 +6659,7 @@
         </p:nvSpPr>
         <p:spPr>
           <a:xfrm>
-            <a:off x="7667110" y="5701775"/>
+            <a:off x="7667110" y="5622820"/>
             <a:ext cx="1784896" cy="972966"/>
           </a:xfrm>
           <a:prstGeom prst="rect">
@@ -6785,13 +6802,17 @@
               </a:ext>
             </a:extLst>
           </p:cNvPr>
-          <p:cNvCxnSpPr/>
+          <p:cNvCxnSpPr>
+            <a:cxnSpLocks/>
+            <a:stCxn id="21" idx="3"/>
+            <a:endCxn id="32" idx="1"/>
+          </p:cNvCxnSpPr>
           <p:nvPr/>
         </p:nvCxnSpPr>
         <p:spPr>
           <a:xfrm>
-            <a:off x="7034537" y="6183536"/>
-            <a:ext cx="678364" cy="26449"/>
+            <a:off x="7015156" y="6109303"/>
+            <a:ext cx="651954" cy="0"/>
           </a:xfrm>
           <a:prstGeom prst="straightConnector1">
             <a:avLst/>
@@ -6826,13 +6847,15 @@
           </p:cNvPr>
           <p:cNvCxnSpPr>
             <a:cxnSpLocks/>
+            <a:stCxn id="37" idx="3"/>
+            <a:endCxn id="15" idx="2"/>
           </p:cNvCxnSpPr>
           <p:nvPr/>
         </p:nvCxnSpPr>
         <p:spPr>
           <a:xfrm flipV="1">
-            <a:off x="3772499" y="2224915"/>
-            <a:ext cx="1263733" cy="181369"/>
+            <a:off x="3514629" y="2260213"/>
+            <a:ext cx="1495807" cy="3116"/>
           </a:xfrm>
           <a:prstGeom prst="straightConnector1">
             <a:avLst/>
@@ -6870,7 +6893,7 @@
         </p:nvSpPr>
         <p:spPr>
           <a:xfrm>
-            <a:off x="2209990" y="1828800"/>
+            <a:off x="2031858" y="1691830"/>
             <a:ext cx="1482771" cy="1142998"/>
           </a:xfrm>
           <a:prstGeom prst="rect">
@@ -7096,13 +7119,17 @@
               </a:ext>
             </a:extLst>
           </p:cNvPr>
-          <p:cNvCxnSpPr/>
+          <p:cNvCxnSpPr>
+            <a:cxnSpLocks/>
+            <a:stCxn id="6" idx="3"/>
+            <a:endCxn id="4" idx="1"/>
+          </p:cNvCxnSpPr>
           <p:nvPr/>
         </p:nvCxnSpPr>
         <p:spPr>
           <a:xfrm>
-            <a:off x="1872609" y="4145501"/>
-            <a:ext cx="923840" cy="17004"/>
+            <a:off x="1879621" y="4151640"/>
+            <a:ext cx="877971" cy="5667"/>
           </a:xfrm>
           <a:prstGeom prst="straightConnector1">
             <a:avLst/>
@@ -7137,13 +7164,15 @@
           </p:cNvPr>
           <p:cNvCxnSpPr>
             <a:cxnSpLocks/>
+            <a:stCxn id="4" idx="3"/>
+            <a:endCxn id="10" idx="1"/>
           </p:cNvCxnSpPr>
           <p:nvPr/>
         </p:nvCxnSpPr>
         <p:spPr>
-          <a:xfrm>
-            <a:off x="5518811" y="4154947"/>
-            <a:ext cx="886076" cy="7559"/>
+          <a:xfrm flipV="1">
+            <a:off x="5514950" y="4157306"/>
+            <a:ext cx="877971" cy="1"/>
           </a:xfrm>
           <a:prstGeom prst="straightConnector1">
             <a:avLst/>
@@ -7231,13 +7260,15 @@
           </p:cNvPr>
           <p:cNvCxnSpPr>
             <a:cxnSpLocks/>
+            <a:stCxn id="10" idx="3"/>
+            <a:endCxn id="3" idx="2"/>
           </p:cNvCxnSpPr>
           <p:nvPr/>
         </p:nvCxnSpPr>
         <p:spPr>
-          <a:xfrm>
-            <a:off x="9143518" y="4145501"/>
-            <a:ext cx="923840" cy="17004"/>
+          <a:xfrm flipV="1">
+            <a:off x="9150279" y="4152852"/>
+            <a:ext cx="914942" cy="4454"/>
           </a:xfrm>
           <a:prstGeom prst="straightConnector1">
             <a:avLst/>
@@ -7275,7 +7306,7 @@
         </p:nvSpPr>
         <p:spPr>
           <a:xfrm>
-            <a:off x="557749" y="3387436"/>
+            <a:off x="566794" y="3429000"/>
             <a:ext cx="1312827" cy="1445280"/>
           </a:xfrm>
           <a:prstGeom prst="rect">
@@ -7491,9 +7522,9 @@
         </p:nvGrpSpPr>
         <p:grpSpPr>
           <a:xfrm>
-            <a:off x="1483005" y="2244703"/>
+            <a:off x="1483005" y="2395575"/>
             <a:ext cx="9139733" cy="3504569"/>
-            <a:chOff x="576632" y="2103009"/>
+            <a:chOff x="576632" y="2253881"/>
             <a:chExt cx="9139733" cy="3504569"/>
           </a:xfrm>
         </p:grpSpPr>
@@ -7560,7 +7591,7 @@
           </p:nvSpPr>
           <p:spPr>
             <a:xfrm>
-              <a:off x="7553813" y="2103009"/>
+              <a:off x="7553813" y="2253881"/>
               <a:ext cx="2162552" cy="3504569"/>
             </a:xfrm>
             <a:prstGeom prst="can">
@@ -7664,13 +7695,17 @@
                 </a:ext>
               </a:extLst>
             </p:cNvPr>
-            <p:cNvCxnSpPr/>
+            <p:cNvCxnSpPr>
+              <a:cxnSpLocks/>
+              <a:stCxn id="12" idx="3"/>
+              <a:endCxn id="20" idx="1"/>
+            </p:cNvCxnSpPr>
             <p:nvPr/>
           </p:nvCxnSpPr>
           <p:spPr>
             <a:xfrm>
-              <a:off x="2118086" y="3994360"/>
-              <a:ext cx="923840" cy="17004"/>
+              <a:off x="2078286" y="4006167"/>
+              <a:ext cx="972385" cy="0"/>
             </a:xfrm>
             <a:prstGeom prst="straightConnector1">
               <a:avLst/>
@@ -7705,13 +7740,15 @@
             </p:cNvPr>
             <p:cNvCxnSpPr>
               <a:cxnSpLocks/>
+              <a:stCxn id="20" idx="3"/>
+              <a:endCxn id="14" idx="2"/>
             </p:cNvCxnSpPr>
             <p:nvPr/>
           </p:nvCxnSpPr>
           <p:spPr>
             <a:xfrm flipV="1">
-              <a:off x="5811492" y="4049148"/>
-              <a:ext cx="1792450" cy="1888"/>
+              <a:off x="5808029" y="4006166"/>
+              <a:ext cx="1745784" cy="1"/>
             </a:xfrm>
             <a:prstGeom prst="straightConnector1">
               <a:avLst/>
@@ -7858,13 +7895,17 @@
               </a:ext>
             </a:extLst>
           </p:cNvPr>
-          <p:cNvCxnSpPr/>
+          <p:cNvCxnSpPr>
+            <a:cxnSpLocks/>
+            <a:stCxn id="12" idx="3"/>
+            <a:endCxn id="24" idx="1"/>
+          </p:cNvCxnSpPr>
           <p:nvPr/>
         </p:nvCxnSpPr>
         <p:spPr>
-          <a:xfrm>
-            <a:off x="3647590" y="3975467"/>
-            <a:ext cx="3255861" cy="7558"/>
+          <a:xfrm flipV="1">
+            <a:off x="3645556" y="3996719"/>
+            <a:ext cx="3257199" cy="2"/>
           </a:xfrm>
           <a:prstGeom prst="straightConnector1">
             <a:avLst/>
@@ -8207,13 +8248,17 @@
               </a:ext>
             </a:extLst>
           </p:cNvPr>
-          <p:cNvCxnSpPr/>
+          <p:cNvCxnSpPr>
+            <a:cxnSpLocks/>
+            <a:stCxn id="9" idx="3"/>
+            <a:endCxn id="10" idx="1"/>
+          </p:cNvCxnSpPr>
           <p:nvPr/>
         </p:nvCxnSpPr>
         <p:spPr>
-          <a:xfrm flipV="1">
-            <a:off x="3752699" y="4182578"/>
-            <a:ext cx="2557200" cy="1888"/>
+          <a:xfrm>
+            <a:off x="3750665" y="4134873"/>
+            <a:ext cx="2559394" cy="1180"/>
           </a:xfrm>
           <a:prstGeom prst="straightConnector1">
             <a:avLst/>
@@ -8460,13 +8505,15 @@
           </p:cNvPr>
           <p:cNvCxnSpPr>
             <a:cxnSpLocks/>
+            <a:stCxn id="4" idx="3"/>
+            <a:endCxn id="8" idx="1"/>
           </p:cNvCxnSpPr>
           <p:nvPr/>
         </p:nvCxnSpPr>
         <p:spPr>
           <a:xfrm flipV="1">
-            <a:off x="3695630" y="3971215"/>
-            <a:ext cx="2915976" cy="30230"/>
+            <a:off x="3702204" y="3994359"/>
+            <a:ext cx="2909979" cy="2362"/>
           </a:xfrm>
           <a:prstGeom prst="straightConnector1">
             <a:avLst/>
@@ -8603,8 +8650,8 @@
           <a:lstStyle/>
           <a:p>
             <a:r>
-              <a:rPr lang="en-US"/>
-              <a:t>S8:Reply Disply</a:t>
+              <a:rPr lang="en-US" dirty="0"/>
+              <a:t>S8:Reply Display</a:t>
             </a:r>
           </a:p>
         </p:txBody>
@@ -9024,13 +9071,17 @@
               </a:ext>
             </a:extLst>
           </p:cNvPr>
-          <p:cNvCxnSpPr/>
+          <p:cNvCxnSpPr>
+            <a:cxnSpLocks/>
+            <a:stCxn id="4" idx="3"/>
+            <a:endCxn id="7" idx="2"/>
+          </p:cNvCxnSpPr>
           <p:nvPr/>
         </p:nvCxnSpPr>
         <p:spPr>
           <a:xfrm>
-            <a:off x="3342956" y="2612842"/>
-            <a:ext cx="1037138" cy="1018309"/>
+            <a:off x="3315107" y="2579779"/>
+            <a:ext cx="1094726" cy="1034367"/>
           </a:xfrm>
           <a:prstGeom prst="straightConnector1">
             <a:avLst/>
@@ -9065,13 +9116,14 @@
           </p:cNvPr>
           <p:cNvCxnSpPr>
             <a:cxnSpLocks/>
+            <a:endCxn id="7" idx="2"/>
           </p:cNvCxnSpPr>
           <p:nvPr/>
         </p:nvCxnSpPr>
         <p:spPr>
           <a:xfrm flipV="1">
-            <a:off x="3344763" y="3659490"/>
-            <a:ext cx="1037139" cy="993749"/>
+            <a:off x="3429000" y="3614146"/>
+            <a:ext cx="980833" cy="988334"/>
           </a:xfrm>
           <a:prstGeom prst="straightConnector1">
             <a:avLst/>
@@ -9106,13 +9158,15 @@
           </p:cNvPr>
           <p:cNvCxnSpPr>
             <a:cxnSpLocks/>
+            <a:stCxn id="7" idx="6"/>
+            <a:endCxn id="9" idx="1"/>
           </p:cNvCxnSpPr>
           <p:nvPr/>
         </p:nvCxnSpPr>
         <p:spPr>
-          <a:xfrm flipV="1">
-            <a:off x="7055299" y="3602813"/>
-            <a:ext cx="508422" cy="11334"/>
+          <a:xfrm>
+            <a:off x="7110542" y="3614146"/>
+            <a:ext cx="455221" cy="2362"/>
           </a:xfrm>
           <a:prstGeom prst="straightConnector1">
             <a:avLst/>

</xml_diff>